<commit_message>
Insert for UML PPT
</commit_message>
<xml_diff>
--- a/Why we use UML_초안.pptx
+++ b/Why we use UML_초안.pptx
@@ -4,6 +4,9 @@
   <p:sldMasterIdLst>
     <p:sldMasterId id="2147483648" r:id="rId1"/>
   </p:sldMasterIdLst>
+  <p:notesMasterIdLst>
+    <p:notesMasterId r:id="rId20"/>
+  </p:notesMasterIdLst>
   <p:sldIdLst>
     <p:sldId id="256" r:id="rId2"/>
     <p:sldId id="261" r:id="rId3"/>
@@ -12,14 +15,14 @@
     <p:sldId id="264" r:id="rId6"/>
     <p:sldId id="265" r:id="rId7"/>
     <p:sldId id="271" r:id="rId8"/>
-    <p:sldId id="270" r:id="rId9"/>
+    <p:sldId id="280" r:id="rId9"/>
     <p:sldId id="275" r:id="rId10"/>
     <p:sldId id="278" r:id="rId11"/>
-    <p:sldId id="279" r:id="rId12"/>
+    <p:sldId id="281" r:id="rId12"/>
     <p:sldId id="266" r:id="rId13"/>
     <p:sldId id="273" r:id="rId14"/>
     <p:sldId id="274" r:id="rId15"/>
-    <p:sldId id="272" r:id="rId16"/>
+    <p:sldId id="282" r:id="rId16"/>
     <p:sldId id="277" r:id="rId17"/>
     <p:sldId id="276" r:id="rId18"/>
     <p:sldId id="262" r:id="rId19"/>
@@ -140,6 +143,452 @@
 </p:presentation>
 </file>
 
+<file path=ppt/notesMasters/notesMaster1.xml><?xml version="1.0" encoding="utf-8"?>
+<p:notesMaster xmlns:a="http://schemas.openxmlformats.org/drawingml/2006/main" xmlns:r="http://schemas.openxmlformats.org/officeDocument/2006/relationships" xmlns:p="http://schemas.openxmlformats.org/presentationml/2006/main">
+  <p:cSld>
+    <p:bg>
+      <p:bgRef idx="1001">
+        <a:schemeClr val="bg1"/>
+      </p:bgRef>
+    </p:bg>
+    <p:spTree>
+      <p:nvGrpSpPr>
+        <p:cNvPr id="1" name=""/>
+        <p:cNvGrpSpPr/>
+        <p:nvPr/>
+      </p:nvGrpSpPr>
+      <p:grpSpPr>
+        <a:xfrm>
+          <a:off x="0" y="0"/>
+          <a:ext cx="0" cy="0"/>
+          <a:chOff x="0" y="0"/>
+          <a:chExt cx="0" cy="0"/>
+        </a:xfrm>
+      </p:grpSpPr>
+      <p:sp>
+        <p:nvSpPr>
+          <p:cNvPr id="2" name="머리글 개체 틀 1"/>
+          <p:cNvSpPr>
+            <a:spLocks noGrp="1"/>
+          </p:cNvSpPr>
+          <p:nvPr>
+            <p:ph type="hdr" sz="quarter"/>
+          </p:nvPr>
+        </p:nvSpPr>
+        <p:spPr>
+          <a:xfrm>
+            <a:off x="0" y="0"/>
+            <a:ext cx="2971800" cy="458788"/>
+          </a:xfrm>
+          <a:prstGeom prst="rect">
+            <a:avLst/>
+          </a:prstGeom>
+        </p:spPr>
+        <p:txBody>
+          <a:bodyPr vert="horz" lIns="91440" tIns="45720" rIns="91440" bIns="45720" rtlCol="0"/>
+          <a:lstStyle>
+            <a:lvl1pPr algn="l">
+              <a:defRPr sz="1200"/>
+            </a:lvl1pPr>
+          </a:lstStyle>
+          <a:p>
+            <a:endParaRPr lang="ko-KR" altLang="en-US"/>
+          </a:p>
+        </p:txBody>
+      </p:sp>
+      <p:sp>
+        <p:nvSpPr>
+          <p:cNvPr id="3" name="날짜 개체 틀 2"/>
+          <p:cNvSpPr>
+            <a:spLocks noGrp="1"/>
+          </p:cNvSpPr>
+          <p:nvPr>
+            <p:ph type="dt" idx="1"/>
+          </p:nvPr>
+        </p:nvSpPr>
+        <p:spPr>
+          <a:xfrm>
+            <a:off x="3884613" y="0"/>
+            <a:ext cx="2971800" cy="458788"/>
+          </a:xfrm>
+          <a:prstGeom prst="rect">
+            <a:avLst/>
+          </a:prstGeom>
+        </p:spPr>
+        <p:txBody>
+          <a:bodyPr vert="horz" lIns="91440" tIns="45720" rIns="91440" bIns="45720" rtlCol="0"/>
+          <a:lstStyle>
+            <a:lvl1pPr algn="r">
+              <a:defRPr sz="1200"/>
+            </a:lvl1pPr>
+          </a:lstStyle>
+          <a:p>
+            <a:fld id="{20A403E4-DE88-4979-B1FF-96D12FACE10A}" type="datetimeFigureOut">
+              <a:rPr lang="ko-KR" altLang="en-US" smtClean="0"/>
+              <a:t>2019-05-15</a:t>
+            </a:fld>
+            <a:endParaRPr lang="ko-KR" altLang="en-US"/>
+          </a:p>
+        </p:txBody>
+      </p:sp>
+      <p:sp>
+        <p:nvSpPr>
+          <p:cNvPr id="4" name="슬라이드 이미지 개체 틀 3"/>
+          <p:cNvSpPr>
+            <a:spLocks noGrp="1" noRot="1" noChangeAspect="1"/>
+          </p:cNvSpPr>
+          <p:nvPr>
+            <p:ph type="sldImg" idx="2"/>
+          </p:nvPr>
+        </p:nvSpPr>
+        <p:spPr>
+          <a:xfrm>
+            <a:off x="685800" y="1143000"/>
+            <a:ext cx="5486400" cy="3086100"/>
+          </a:xfrm>
+          <a:prstGeom prst="rect">
+            <a:avLst/>
+          </a:prstGeom>
+          <a:noFill/>
+          <a:ln w="12700">
+            <a:solidFill>
+              <a:prstClr val="black"/>
+            </a:solidFill>
+          </a:ln>
+        </p:spPr>
+        <p:txBody>
+          <a:bodyPr vert="horz" lIns="91440" tIns="45720" rIns="91440" bIns="45720" rtlCol="0" anchor="ctr"/>
+          <a:lstStyle/>
+          <a:p>
+            <a:endParaRPr lang="ko-KR" altLang="en-US"/>
+          </a:p>
+        </p:txBody>
+      </p:sp>
+      <p:sp>
+        <p:nvSpPr>
+          <p:cNvPr id="5" name="슬라이드 노트 개체 틀 4"/>
+          <p:cNvSpPr>
+            <a:spLocks noGrp="1"/>
+          </p:cNvSpPr>
+          <p:nvPr>
+            <p:ph type="body" sz="quarter" idx="3"/>
+          </p:nvPr>
+        </p:nvSpPr>
+        <p:spPr>
+          <a:xfrm>
+            <a:off x="685800" y="4400550"/>
+            <a:ext cx="5486400" cy="3600450"/>
+          </a:xfrm>
+          <a:prstGeom prst="rect">
+            <a:avLst/>
+          </a:prstGeom>
+        </p:spPr>
+        <p:txBody>
+          <a:bodyPr vert="horz" lIns="91440" tIns="45720" rIns="91440" bIns="45720" rtlCol="0"/>
+          <a:lstStyle/>
+          <a:p>
+            <a:pPr lvl="0"/>
+            <a:r>
+              <a:rPr lang="ko-KR" altLang="en-US"/>
+              <a:t>마스터 텍스트 스타일을 편집하려면 클릭</a:t>
+            </a:r>
+          </a:p>
+          <a:p>
+            <a:pPr lvl="1"/>
+            <a:r>
+              <a:rPr lang="ko-KR" altLang="en-US"/>
+              <a:t>두 번째 수준</a:t>
+            </a:r>
+          </a:p>
+          <a:p>
+            <a:pPr lvl="2"/>
+            <a:r>
+              <a:rPr lang="ko-KR" altLang="en-US"/>
+              <a:t>세 번째 수준</a:t>
+            </a:r>
+          </a:p>
+          <a:p>
+            <a:pPr lvl="3"/>
+            <a:r>
+              <a:rPr lang="ko-KR" altLang="en-US"/>
+              <a:t>네 번째 수준</a:t>
+            </a:r>
+          </a:p>
+          <a:p>
+            <a:pPr lvl="4"/>
+            <a:r>
+              <a:rPr lang="ko-KR" altLang="en-US"/>
+              <a:t>다섯 번째 수준</a:t>
+            </a:r>
+          </a:p>
+        </p:txBody>
+      </p:sp>
+      <p:sp>
+        <p:nvSpPr>
+          <p:cNvPr id="6" name="바닥글 개체 틀 5"/>
+          <p:cNvSpPr>
+            <a:spLocks noGrp="1"/>
+          </p:cNvSpPr>
+          <p:nvPr>
+            <p:ph type="ftr" sz="quarter" idx="4"/>
+          </p:nvPr>
+        </p:nvSpPr>
+        <p:spPr>
+          <a:xfrm>
+            <a:off x="0" y="8685213"/>
+            <a:ext cx="2971800" cy="458787"/>
+          </a:xfrm>
+          <a:prstGeom prst="rect">
+            <a:avLst/>
+          </a:prstGeom>
+        </p:spPr>
+        <p:txBody>
+          <a:bodyPr vert="horz" lIns="91440" tIns="45720" rIns="91440" bIns="45720" rtlCol="0" anchor="b"/>
+          <a:lstStyle>
+            <a:lvl1pPr algn="l">
+              <a:defRPr sz="1200"/>
+            </a:lvl1pPr>
+          </a:lstStyle>
+          <a:p>
+            <a:endParaRPr lang="ko-KR" altLang="en-US"/>
+          </a:p>
+        </p:txBody>
+      </p:sp>
+      <p:sp>
+        <p:nvSpPr>
+          <p:cNvPr id="7" name="슬라이드 번호 개체 틀 6"/>
+          <p:cNvSpPr>
+            <a:spLocks noGrp="1"/>
+          </p:cNvSpPr>
+          <p:nvPr>
+            <p:ph type="sldNum" sz="quarter" idx="5"/>
+          </p:nvPr>
+        </p:nvSpPr>
+        <p:spPr>
+          <a:xfrm>
+            <a:off x="3884613" y="8685213"/>
+            <a:ext cx="2971800" cy="458787"/>
+          </a:xfrm>
+          <a:prstGeom prst="rect">
+            <a:avLst/>
+          </a:prstGeom>
+        </p:spPr>
+        <p:txBody>
+          <a:bodyPr vert="horz" lIns="91440" tIns="45720" rIns="91440" bIns="45720" rtlCol="0" anchor="b"/>
+          <a:lstStyle>
+            <a:lvl1pPr algn="r">
+              <a:defRPr sz="1200"/>
+            </a:lvl1pPr>
+          </a:lstStyle>
+          <a:p>
+            <a:fld id="{30846C61-D62B-4651-A0E4-6D800047FAFF}" type="slidenum">
+              <a:rPr lang="ko-KR" altLang="en-US" smtClean="0"/>
+              <a:t>‹#›</a:t>
+            </a:fld>
+            <a:endParaRPr lang="ko-KR" altLang="en-US"/>
+          </a:p>
+        </p:txBody>
+      </p:sp>
+    </p:spTree>
+    <p:extLst>
+      <p:ext uri="{BB962C8B-B14F-4D97-AF65-F5344CB8AC3E}">
+        <p14:creationId xmlns:p14="http://schemas.microsoft.com/office/powerpoint/2010/main" val="3316349495"/>
+      </p:ext>
+    </p:extLst>
+  </p:cSld>
+  <p:clrMap bg1="lt1" tx1="dk1" bg2="lt2" tx2="dk2" accent1="accent1" accent2="accent2" accent3="accent3" accent4="accent4" accent5="accent5" accent6="accent6" hlink="hlink" folHlink="folHlink"/>
+  <p:notesStyle>
+    <a:lvl1pPr marL="0" algn="l" defTabSz="914400" rtl="0" eaLnBrk="1" latinLnBrk="1" hangingPunct="1">
+      <a:defRPr sz="1200" kern="1200">
+        <a:solidFill>
+          <a:schemeClr val="tx1"/>
+        </a:solidFill>
+        <a:latin typeface="+mn-lt"/>
+        <a:ea typeface="+mn-ea"/>
+        <a:cs typeface="+mn-cs"/>
+      </a:defRPr>
+    </a:lvl1pPr>
+    <a:lvl2pPr marL="457200" algn="l" defTabSz="914400" rtl="0" eaLnBrk="1" latinLnBrk="1" hangingPunct="1">
+      <a:defRPr sz="1200" kern="1200">
+        <a:solidFill>
+          <a:schemeClr val="tx1"/>
+        </a:solidFill>
+        <a:latin typeface="+mn-lt"/>
+        <a:ea typeface="+mn-ea"/>
+        <a:cs typeface="+mn-cs"/>
+      </a:defRPr>
+    </a:lvl2pPr>
+    <a:lvl3pPr marL="914400" algn="l" defTabSz="914400" rtl="0" eaLnBrk="1" latinLnBrk="1" hangingPunct="1">
+      <a:defRPr sz="1200" kern="1200">
+        <a:solidFill>
+          <a:schemeClr val="tx1"/>
+        </a:solidFill>
+        <a:latin typeface="+mn-lt"/>
+        <a:ea typeface="+mn-ea"/>
+        <a:cs typeface="+mn-cs"/>
+      </a:defRPr>
+    </a:lvl3pPr>
+    <a:lvl4pPr marL="1371600" algn="l" defTabSz="914400" rtl="0" eaLnBrk="1" latinLnBrk="1" hangingPunct="1">
+      <a:defRPr sz="1200" kern="1200">
+        <a:solidFill>
+          <a:schemeClr val="tx1"/>
+        </a:solidFill>
+        <a:latin typeface="+mn-lt"/>
+        <a:ea typeface="+mn-ea"/>
+        <a:cs typeface="+mn-cs"/>
+      </a:defRPr>
+    </a:lvl4pPr>
+    <a:lvl5pPr marL="1828800" algn="l" defTabSz="914400" rtl="0" eaLnBrk="1" latinLnBrk="1" hangingPunct="1">
+      <a:defRPr sz="1200" kern="1200">
+        <a:solidFill>
+          <a:schemeClr val="tx1"/>
+        </a:solidFill>
+        <a:latin typeface="+mn-lt"/>
+        <a:ea typeface="+mn-ea"/>
+        <a:cs typeface="+mn-cs"/>
+      </a:defRPr>
+    </a:lvl5pPr>
+    <a:lvl6pPr marL="2286000" algn="l" defTabSz="914400" rtl="0" eaLnBrk="1" latinLnBrk="1" hangingPunct="1">
+      <a:defRPr sz="1200" kern="1200">
+        <a:solidFill>
+          <a:schemeClr val="tx1"/>
+        </a:solidFill>
+        <a:latin typeface="+mn-lt"/>
+        <a:ea typeface="+mn-ea"/>
+        <a:cs typeface="+mn-cs"/>
+      </a:defRPr>
+    </a:lvl6pPr>
+    <a:lvl7pPr marL="2743200" algn="l" defTabSz="914400" rtl="0" eaLnBrk="1" latinLnBrk="1" hangingPunct="1">
+      <a:defRPr sz="1200" kern="1200">
+        <a:solidFill>
+          <a:schemeClr val="tx1"/>
+        </a:solidFill>
+        <a:latin typeface="+mn-lt"/>
+        <a:ea typeface="+mn-ea"/>
+        <a:cs typeface="+mn-cs"/>
+      </a:defRPr>
+    </a:lvl7pPr>
+    <a:lvl8pPr marL="3200400" algn="l" defTabSz="914400" rtl="0" eaLnBrk="1" latinLnBrk="1" hangingPunct="1">
+      <a:defRPr sz="1200" kern="1200">
+        <a:solidFill>
+          <a:schemeClr val="tx1"/>
+        </a:solidFill>
+        <a:latin typeface="+mn-lt"/>
+        <a:ea typeface="+mn-ea"/>
+        <a:cs typeface="+mn-cs"/>
+      </a:defRPr>
+    </a:lvl8pPr>
+    <a:lvl9pPr marL="3657600" algn="l" defTabSz="914400" rtl="0" eaLnBrk="1" latinLnBrk="1" hangingPunct="1">
+      <a:defRPr sz="1200" kern="1200">
+        <a:solidFill>
+          <a:schemeClr val="tx1"/>
+        </a:solidFill>
+        <a:latin typeface="+mn-lt"/>
+        <a:ea typeface="+mn-ea"/>
+        <a:cs typeface="+mn-cs"/>
+      </a:defRPr>
+    </a:lvl9pPr>
+  </p:notesStyle>
+</p:notesMaster>
+</file>
+
+<file path=ppt/notesSlides/notesSlide1.xml><?xml version="1.0" encoding="utf-8"?>
+<p:notes xmlns:a="http://schemas.openxmlformats.org/drawingml/2006/main" xmlns:r="http://schemas.openxmlformats.org/officeDocument/2006/relationships" xmlns:p="http://schemas.openxmlformats.org/presentationml/2006/main">
+  <p:cSld>
+    <p:spTree>
+      <p:nvGrpSpPr>
+        <p:cNvPr id="1" name=""/>
+        <p:cNvGrpSpPr/>
+        <p:nvPr/>
+      </p:nvGrpSpPr>
+      <p:grpSpPr>
+        <a:xfrm>
+          <a:off x="0" y="0"/>
+          <a:ext cx="0" cy="0"/>
+          <a:chOff x="0" y="0"/>
+          <a:chExt cx="0" cy="0"/>
+        </a:xfrm>
+      </p:grpSpPr>
+      <p:sp>
+        <p:nvSpPr>
+          <p:cNvPr id="2" name="슬라이드 이미지 개체 틀 1"/>
+          <p:cNvSpPr>
+            <a:spLocks noGrp="1" noRot="1" noChangeAspect="1"/>
+          </p:cNvSpPr>
+          <p:nvPr>
+            <p:ph type="sldImg"/>
+          </p:nvPr>
+        </p:nvSpPr>
+        <p:spPr/>
+      </p:sp>
+      <p:sp>
+        <p:nvSpPr>
+          <p:cNvPr id="3" name="슬라이드 노트 개체 틀 2"/>
+          <p:cNvSpPr>
+            <a:spLocks noGrp="1"/>
+          </p:cNvSpPr>
+          <p:nvPr>
+            <p:ph type="body" idx="1"/>
+          </p:nvPr>
+        </p:nvSpPr>
+        <p:spPr/>
+        <p:txBody>
+          <a:bodyPr/>
+          <a:lstStyle/>
+          <a:p>
+            <a:r>
+              <a:rPr lang="ko-KR" altLang="en-US" dirty="0"/>
+              <a:t>팀원들의 프로젝트에 필요한 지식과 의지가 부족하다</a:t>
+            </a:r>
+            <a:r>
+              <a:rPr lang="en-US" altLang="ko-KR" dirty="0"/>
+              <a:t>.</a:t>
+            </a:r>
+          </a:p>
+          <a:p>
+            <a:r>
+              <a:rPr lang="ko-KR" altLang="en-US"/>
+              <a:t>요구사항 분석단계부터</a:t>
+            </a:r>
+          </a:p>
+        </p:txBody>
+      </p:sp>
+      <p:sp>
+        <p:nvSpPr>
+          <p:cNvPr id="4" name="슬라이드 번호 개체 틀 3"/>
+          <p:cNvSpPr>
+            <a:spLocks noGrp="1"/>
+          </p:cNvSpPr>
+          <p:nvPr>
+            <p:ph type="sldNum" sz="quarter" idx="5"/>
+          </p:nvPr>
+        </p:nvSpPr>
+        <p:spPr/>
+        <p:txBody>
+          <a:bodyPr/>
+          <a:lstStyle/>
+          <a:p>
+            <a:fld id="{30846C61-D62B-4651-A0E4-6D800047FAFF}" type="slidenum">
+              <a:rPr lang="ko-KR" altLang="en-US" smtClean="0"/>
+              <a:t>4</a:t>
+            </a:fld>
+            <a:endParaRPr lang="ko-KR" altLang="en-US"/>
+          </a:p>
+        </p:txBody>
+      </p:sp>
+    </p:spTree>
+    <p:extLst>
+      <p:ext uri="{BB962C8B-B14F-4D97-AF65-F5344CB8AC3E}">
+        <p14:creationId xmlns:p14="http://schemas.microsoft.com/office/powerpoint/2010/main" val="2806858926"/>
+      </p:ext>
+    </p:extLst>
+  </p:cSld>
+  <p:clrMapOvr>
+    <a:masterClrMapping/>
+  </p:clrMapOvr>
+</p:notes>
+</file>
+
 <file path=ppt/slideLayouts/slideLayout1.xml><?xml version="1.0" encoding="utf-8"?>
 <p:sldLayout xmlns:a="http://schemas.openxmlformats.org/drawingml/2006/main" xmlns:r="http://schemas.openxmlformats.org/officeDocument/2006/relationships" xmlns:p="http://schemas.openxmlformats.org/presentationml/2006/main" type="title" preserve="1">
   <p:cSld name="제목 슬라이드">
@@ -269,7 +718,7 @@
           <a:p>
             <a:fld id="{774C04DF-E3D8-4F97-B2E1-5F4BA824A476}" type="datetimeFigureOut">
               <a:rPr lang="ko-KR" altLang="en-US" smtClean="0"/>
-              <a:t>2019-05-14</a:t>
+              <a:t>2019-05-15</a:t>
             </a:fld>
             <a:endParaRPr lang="ko-KR" altLang="en-US"/>
           </a:p>
@@ -437,7 +886,7 @@
           <a:p>
             <a:fld id="{774C04DF-E3D8-4F97-B2E1-5F4BA824A476}" type="datetimeFigureOut">
               <a:rPr lang="ko-KR" altLang="en-US" smtClean="0"/>
-              <a:t>2019-05-14</a:t>
+              <a:t>2019-05-15</a:t>
             </a:fld>
             <a:endParaRPr lang="ko-KR" altLang="en-US"/>
           </a:p>
@@ -615,7 +1064,7 @@
           <a:p>
             <a:fld id="{774C04DF-E3D8-4F97-B2E1-5F4BA824A476}" type="datetimeFigureOut">
               <a:rPr lang="ko-KR" altLang="en-US" smtClean="0"/>
-              <a:t>2019-05-14</a:t>
+              <a:t>2019-05-15</a:t>
             </a:fld>
             <a:endParaRPr lang="ko-KR" altLang="en-US"/>
           </a:p>
@@ -783,7 +1232,7 @@
           <a:p>
             <a:fld id="{774C04DF-E3D8-4F97-B2E1-5F4BA824A476}" type="datetimeFigureOut">
               <a:rPr lang="ko-KR" altLang="en-US" smtClean="0"/>
-              <a:t>2019-05-14</a:t>
+              <a:t>2019-05-15</a:t>
             </a:fld>
             <a:endParaRPr lang="ko-KR" altLang="en-US"/>
           </a:p>
@@ -1028,7 +1477,7 @@
           <a:p>
             <a:fld id="{774C04DF-E3D8-4F97-B2E1-5F4BA824A476}" type="datetimeFigureOut">
               <a:rPr lang="ko-KR" altLang="en-US" smtClean="0"/>
-              <a:t>2019-05-14</a:t>
+              <a:t>2019-05-15</a:t>
             </a:fld>
             <a:endParaRPr lang="ko-KR" altLang="en-US"/>
           </a:p>
@@ -1257,7 +1706,7 @@
           <a:p>
             <a:fld id="{774C04DF-E3D8-4F97-B2E1-5F4BA824A476}" type="datetimeFigureOut">
               <a:rPr lang="ko-KR" altLang="en-US" smtClean="0"/>
-              <a:t>2019-05-14</a:t>
+              <a:t>2019-05-15</a:t>
             </a:fld>
             <a:endParaRPr lang="ko-KR" altLang="en-US"/>
           </a:p>
@@ -1621,7 +2070,7 @@
           <a:p>
             <a:fld id="{774C04DF-E3D8-4F97-B2E1-5F4BA824A476}" type="datetimeFigureOut">
               <a:rPr lang="ko-KR" altLang="en-US" smtClean="0"/>
-              <a:t>2019-05-14</a:t>
+              <a:t>2019-05-15</a:t>
             </a:fld>
             <a:endParaRPr lang="ko-KR" altLang="en-US"/>
           </a:p>
@@ -1738,7 +2187,7 @@
           <a:p>
             <a:fld id="{774C04DF-E3D8-4F97-B2E1-5F4BA824A476}" type="datetimeFigureOut">
               <a:rPr lang="ko-KR" altLang="en-US" smtClean="0"/>
-              <a:t>2019-05-14</a:t>
+              <a:t>2019-05-15</a:t>
             </a:fld>
             <a:endParaRPr lang="ko-KR" altLang="en-US"/>
           </a:p>
@@ -1833,7 +2282,7 @@
           <a:p>
             <a:fld id="{774C04DF-E3D8-4F97-B2E1-5F4BA824A476}" type="datetimeFigureOut">
               <a:rPr lang="ko-KR" altLang="en-US" smtClean="0"/>
-              <a:t>2019-05-14</a:t>
+              <a:t>2019-05-15</a:t>
             </a:fld>
             <a:endParaRPr lang="ko-KR" altLang="en-US"/>
           </a:p>
@@ -2108,7 +2557,7 @@
           <a:p>
             <a:fld id="{774C04DF-E3D8-4F97-B2E1-5F4BA824A476}" type="datetimeFigureOut">
               <a:rPr lang="ko-KR" altLang="en-US" smtClean="0"/>
-              <a:t>2019-05-14</a:t>
+              <a:t>2019-05-15</a:t>
             </a:fld>
             <a:endParaRPr lang="ko-KR" altLang="en-US"/>
           </a:p>
@@ -2360,7 +2809,7 @@
           <a:p>
             <a:fld id="{774C04DF-E3D8-4F97-B2E1-5F4BA824A476}" type="datetimeFigureOut">
               <a:rPr lang="ko-KR" altLang="en-US" smtClean="0"/>
-              <a:t>2019-05-14</a:t>
+              <a:t>2019-05-15</a:t>
             </a:fld>
             <a:endParaRPr lang="ko-KR" altLang="en-US"/>
           </a:p>
@@ -2571,7 +3020,7 @@
           <a:p>
             <a:fld id="{774C04DF-E3D8-4F97-B2E1-5F4BA824A476}" type="datetimeFigureOut">
               <a:rPr lang="ko-KR" altLang="en-US" smtClean="0"/>
-              <a:t>2019-05-14</a:t>
+              <a:t>2019-05-15</a:t>
             </a:fld>
             <a:endParaRPr lang="ko-KR" altLang="en-US"/>
           </a:p>
@@ -4053,7 +4502,7 @@
       </p:grpSpPr>
       <p:pic>
         <p:nvPicPr>
-          <p:cNvPr id="6" name="그림 5"/>
+          <p:cNvPr id="10" name="그림 9"/>
           <p:cNvPicPr>
             <a:picLocks noChangeAspect="1"/>
           </p:cNvPicPr>
@@ -4067,13 +4516,13 @@
               </a:ext>
             </a:extLst>
           </a:blip>
-          <a:srcRect t="7845" b="7845"/>
+          <a:srcRect l="1617" r="7025"/>
           <a:stretch/>
         </p:blipFill>
         <p:spPr>
           <a:xfrm>
-            <a:off x="0" y="0"/>
-            <a:ext cx="12192000" cy="6858000"/>
+            <a:off x="682048" y="-1"/>
+            <a:ext cx="11522864" cy="6865263"/>
           </a:xfrm>
           <a:prstGeom prst="rect">
             <a:avLst/>
@@ -4088,7 +4537,7 @@
         </p:nvSpPr>
         <p:spPr>
           <a:xfrm>
-            <a:off x="0" y="0"/>
+            <a:off x="0" y="7261"/>
             <a:ext cx="12204912" cy="6858001"/>
           </a:xfrm>
           <a:prstGeom prst="rect">
@@ -4096,7 +4545,7 @@
           </a:prstGeom>
           <a:solidFill>
             <a:schemeClr val="accent6">
-              <a:alpha val="80000"/>
+              <a:alpha val="60000"/>
             </a:schemeClr>
           </a:solidFill>
           <a:ln>
@@ -4188,7 +4637,7 @@
         <p:spPr>
           <a:xfrm>
             <a:off x="298173" y="337932"/>
-            <a:ext cx="955711" cy="1107996"/>
+            <a:ext cx="1165704" cy="1107996"/>
           </a:xfrm>
           <a:prstGeom prst="rect">
             <a:avLst/>
@@ -4202,7 +4651,7 @@
           <a:lstStyle/>
           <a:p>
             <a:r>
-              <a:rPr lang="en-US" altLang="ko-KR" sz="6600" dirty="0">
+              <a:rPr lang="en-US" altLang="ko-KR" sz="6600" b="1" dirty="0">
                 <a:solidFill>
                   <a:schemeClr val="accent3">
                     <a:lumMod val="20000"/>
@@ -4212,9 +4661,9 @@
                 <a:latin typeface="나눔바른펜" panose="020B0503000000000000" pitchFamily="50" charset="-127"/>
                 <a:ea typeface="나눔바른펜" panose="020B0503000000000000" pitchFamily="50" charset="-127"/>
               </a:rPr>
-              <a:t>02</a:t>
-            </a:r>
-            <a:endParaRPr lang="ko-KR" altLang="en-US" sz="6600" dirty="0">
+              <a:t>03</a:t>
+            </a:r>
+            <a:endParaRPr lang="ko-KR" altLang="en-US" sz="6600" b="1" dirty="0">
               <a:solidFill>
                 <a:schemeClr val="accent3">
                   <a:lumMod val="20000"/>
@@ -4238,7 +4687,7 @@
         <p:spPr>
           <a:xfrm>
             <a:off x="248478" y="1560444"/>
-            <a:ext cx="906020" cy="0"/>
+            <a:ext cx="1320346" cy="0"/>
           </a:xfrm>
           <a:prstGeom prst="line">
             <a:avLst/>
@@ -4275,10 +4724,10 @@
         </p:nvGrpSpPr>
         <p:grpSpPr>
           <a:xfrm>
-            <a:off x="2820277" y="3429000"/>
-            <a:ext cx="4517521" cy="803870"/>
-            <a:chOff x="2183152" y="2604052"/>
-            <a:chExt cx="3011556" cy="803870"/>
+            <a:off x="2779923" y="2304545"/>
+            <a:ext cx="9227668" cy="1338828"/>
+            <a:chOff x="2136048" y="2607702"/>
+            <a:chExt cx="4042067" cy="413625"/>
           </a:xfrm>
         </p:grpSpPr>
         <p:sp>
@@ -4289,8 +4738,8 @@
           </p:nvSpPr>
           <p:spPr>
             <a:xfrm>
-              <a:off x="2183152" y="2604052"/>
-              <a:ext cx="2359737" cy="646331"/>
+              <a:off x="2136048" y="2607702"/>
+              <a:ext cx="3760292" cy="242470"/>
             </a:xfrm>
             <a:prstGeom prst="rect">
               <a:avLst/>
@@ -4303,23 +4752,15 @@
             </a:bodyPr>
             <a:lstStyle/>
             <a:p>
+              <a:pPr algn="ctr"/>
               <a:r>
-                <a:rPr lang="en-US" altLang="ko-KR" sz="3600" b="1" dirty="0">
+                <a:rPr lang="en-US" altLang="ko-KR" sz="4500" b="1" dirty="0">
                   <a:solidFill>
-                    <a:schemeClr val="accent2">
-                      <a:lumMod val="50000"/>
-                    </a:schemeClr>
+                    <a:schemeClr val="accent1"/>
                   </a:solidFill>
                 </a:rPr>
-                <a:t>Insert Text Here</a:t>
+                <a:t>How to use Package Diagram?</a:t>
               </a:r>
-              <a:endParaRPr lang="ko-KR" altLang="en-US" sz="3600" b="1" dirty="0">
-                <a:solidFill>
-                  <a:schemeClr val="accent2">
-                    <a:lumMod val="50000"/>
-                  </a:schemeClr>
-                </a:solidFill>
-              </a:endParaRPr>
             </a:p>
           </p:txBody>
         </p:sp>
@@ -4331,8 +4772,8 @@
           </p:nvSpPr>
           <p:spPr>
             <a:xfrm>
-              <a:off x="2183152" y="3100145"/>
-              <a:ext cx="3011556" cy="307777"/>
+              <a:off x="3048611" y="2850172"/>
+              <a:ext cx="3129504" cy="171155"/>
             </a:xfrm>
             <a:prstGeom prst="rect">
               <a:avLst/>
@@ -4345,23 +4786,17 @@
             </a:bodyPr>
             <a:lstStyle/>
             <a:p>
+              <a:pPr algn="just"/>
               <a:r>
-                <a:rPr lang="en-US" altLang="ko-KR" sz="1400" dirty="0">
+                <a:rPr lang="en-US" altLang="ko-KR" sz="3000" dirty="0">
                   <a:solidFill>
                     <a:schemeClr val="accent2">
                       <a:lumMod val="50000"/>
                     </a:schemeClr>
                   </a:solidFill>
                 </a:rPr>
-                <a:t>Lorem Ipsum is simply dummy text of the printing</a:t>
+                <a:t>Explain for Package diagram mechanism</a:t>
               </a:r>
-              <a:endParaRPr lang="ko-KR" altLang="en-US" sz="1400" dirty="0">
-                <a:solidFill>
-                  <a:schemeClr val="accent2">
-                    <a:lumMod val="50000"/>
-                  </a:schemeClr>
-                </a:solidFill>
-              </a:endParaRPr>
             </a:p>
           </p:txBody>
         </p:sp>
@@ -4369,7 +4804,7 @@
     </p:spTree>
     <p:extLst>
       <p:ext uri="{BB962C8B-B14F-4D97-AF65-F5344CB8AC3E}">
-        <p14:creationId xmlns:p14="http://schemas.microsoft.com/office/powerpoint/2010/main" val="1394650743"/>
+        <p14:creationId xmlns:p14="http://schemas.microsoft.com/office/powerpoint/2010/main" val="3461171836"/>
       </p:ext>
     </p:extLst>
   </p:cSld>
@@ -5097,7 +5532,7 @@
       </p:grpSpPr>
       <p:pic>
         <p:nvPicPr>
-          <p:cNvPr id="6" name="그림 5"/>
+          <p:cNvPr id="10" name="그림 9"/>
           <p:cNvPicPr>
             <a:picLocks noChangeAspect="1"/>
           </p:cNvPicPr>
@@ -5111,13 +5546,13 @@
               </a:ext>
             </a:extLst>
           </a:blip>
-          <a:srcRect t="7845" b="7845"/>
+          <a:srcRect l="1617" r="7025"/>
           <a:stretch/>
         </p:blipFill>
         <p:spPr>
           <a:xfrm>
-            <a:off x="0" y="0"/>
-            <a:ext cx="12192000" cy="6858000"/>
+            <a:off x="682048" y="-1"/>
+            <a:ext cx="11522864" cy="6865263"/>
           </a:xfrm>
           <a:prstGeom prst="rect">
             <a:avLst/>
@@ -5132,7 +5567,7 @@
         </p:nvSpPr>
         <p:spPr>
           <a:xfrm>
-            <a:off x="0" y="0"/>
+            <a:off x="0" y="7261"/>
             <a:ext cx="12204912" cy="6858001"/>
           </a:xfrm>
           <a:prstGeom prst="rect">
@@ -5140,7 +5575,7 @@
           </a:prstGeom>
           <a:solidFill>
             <a:schemeClr val="accent6">
-              <a:alpha val="80000"/>
+              <a:alpha val="60000"/>
             </a:schemeClr>
           </a:solidFill>
           <a:ln>
@@ -5232,7 +5667,7 @@
         <p:spPr>
           <a:xfrm>
             <a:off x="298173" y="337932"/>
-            <a:ext cx="955711" cy="1107996"/>
+            <a:ext cx="1165704" cy="1107996"/>
           </a:xfrm>
           <a:prstGeom prst="rect">
             <a:avLst/>
@@ -5246,7 +5681,7 @@
           <a:lstStyle/>
           <a:p>
             <a:r>
-              <a:rPr lang="en-US" altLang="ko-KR" sz="6600" dirty="0">
+              <a:rPr lang="en-US" altLang="ko-KR" sz="6600" b="1" dirty="0">
                 <a:solidFill>
                   <a:schemeClr val="accent3">
                     <a:lumMod val="20000"/>
@@ -5256,9 +5691,9 @@
                 <a:latin typeface="나눔바른펜" panose="020B0503000000000000" pitchFamily="50" charset="-127"/>
                 <a:ea typeface="나눔바른펜" panose="020B0503000000000000" pitchFamily="50" charset="-127"/>
               </a:rPr>
-              <a:t>02</a:t>
-            </a:r>
-            <a:endParaRPr lang="ko-KR" altLang="en-US" sz="6600" dirty="0">
+              <a:t>04</a:t>
+            </a:r>
+            <a:endParaRPr lang="ko-KR" altLang="en-US" sz="6600" b="1" dirty="0">
               <a:solidFill>
                 <a:schemeClr val="accent3">
                   <a:lumMod val="20000"/>
@@ -5282,7 +5717,7 @@
         <p:spPr>
           <a:xfrm>
             <a:off x="248478" y="1560444"/>
-            <a:ext cx="906020" cy="0"/>
+            <a:ext cx="1320346" cy="0"/>
           </a:xfrm>
           <a:prstGeom prst="line">
             <a:avLst/>
@@ -5319,10 +5754,10 @@
         </p:nvGrpSpPr>
         <p:grpSpPr>
           <a:xfrm>
-            <a:off x="2820277" y="3429000"/>
-            <a:ext cx="4517521" cy="803870"/>
-            <a:chOff x="2183152" y="2604052"/>
-            <a:chExt cx="3011556" cy="803870"/>
+            <a:off x="2928292" y="2394193"/>
+            <a:ext cx="7893856" cy="1338828"/>
+            <a:chOff x="2753963" y="2607702"/>
+            <a:chExt cx="3457807" cy="413625"/>
           </a:xfrm>
         </p:grpSpPr>
         <p:sp>
@@ -5333,8 +5768,8 @@
           </p:nvSpPr>
           <p:spPr>
             <a:xfrm>
-              <a:off x="2183152" y="2604052"/>
-              <a:ext cx="2359737" cy="646331"/>
+              <a:off x="2753963" y="2607702"/>
+              <a:ext cx="2524462" cy="242470"/>
             </a:xfrm>
             <a:prstGeom prst="rect">
               <a:avLst/>
@@ -5347,23 +5782,15 @@
             </a:bodyPr>
             <a:lstStyle/>
             <a:p>
+              <a:pPr algn="ctr"/>
               <a:r>
-                <a:rPr lang="en-US" altLang="ko-KR" sz="3600" b="1" dirty="0">
+                <a:rPr lang="en-US" altLang="ko-KR" sz="4500" b="1" dirty="0">
                   <a:solidFill>
-                    <a:schemeClr val="accent2">
-                      <a:lumMod val="50000"/>
-                    </a:schemeClr>
+                    <a:schemeClr val="accent1"/>
                   </a:solidFill>
                 </a:rPr>
-                <a:t>Insert Text Here</a:t>
+                <a:t>Cooperative attitude</a:t>
               </a:r>
-              <a:endParaRPr lang="ko-KR" altLang="en-US" sz="3600" b="1" dirty="0">
-                <a:solidFill>
-                  <a:schemeClr val="accent2">
-                    <a:lumMod val="50000"/>
-                  </a:schemeClr>
-                </a:solidFill>
-              </a:endParaRPr>
             </a:p>
           </p:txBody>
         </p:sp>
@@ -5375,8 +5802,8 @@
           </p:nvSpPr>
           <p:spPr>
             <a:xfrm>
-              <a:off x="2183152" y="3100145"/>
-              <a:ext cx="3011556" cy="307777"/>
+              <a:off x="3048611" y="2850172"/>
+              <a:ext cx="3163159" cy="171155"/>
             </a:xfrm>
             <a:prstGeom prst="rect">
               <a:avLst/>
@@ -5389,23 +5816,17 @@
             </a:bodyPr>
             <a:lstStyle/>
             <a:p>
+              <a:pPr algn="just"/>
               <a:r>
-                <a:rPr lang="en-US" altLang="ko-KR" sz="1400" dirty="0">
+                <a:rPr lang="en-US" altLang="ko-KR" sz="3000" dirty="0">
                   <a:solidFill>
                     <a:schemeClr val="accent2">
                       <a:lumMod val="50000"/>
                     </a:schemeClr>
                   </a:solidFill>
                 </a:rPr>
-                <a:t>Lorem Ipsum is simply dummy text of the printing</a:t>
+                <a:t>Introduce our GIT HUB and Google Docs</a:t>
               </a:r>
-              <a:endParaRPr lang="ko-KR" altLang="en-US" sz="1400" dirty="0">
-                <a:solidFill>
-                  <a:schemeClr val="accent2">
-                    <a:lumMod val="50000"/>
-                  </a:schemeClr>
-                </a:solidFill>
-              </a:endParaRPr>
             </a:p>
           </p:txBody>
         </p:sp>
@@ -5413,7 +5834,7 @@
     </p:spTree>
     <p:extLst>
       <p:ext uri="{BB962C8B-B14F-4D97-AF65-F5344CB8AC3E}">
-        <p14:creationId xmlns:p14="http://schemas.microsoft.com/office/powerpoint/2010/main" val="1249408583"/>
+        <p14:creationId xmlns:p14="http://schemas.microsoft.com/office/powerpoint/2010/main" val="664733860"/>
       </p:ext>
     </p:extLst>
   </p:cSld>
@@ -5970,7 +6391,7 @@
           <a:p>
             <a:pPr algn="ctr"/>
             <a:r>
-              <a:rPr lang="en-US" altLang="ko-KR" sz="4400" dirty="0">
+              <a:rPr lang="en-US" altLang="ko-KR" sz="4400" b="1" dirty="0">
                 <a:solidFill>
                   <a:schemeClr val="tx1">
                     <a:lumMod val="65000"/>
@@ -5981,7 +6402,7 @@
               </a:rPr>
               <a:t>Thank You</a:t>
             </a:r>
-            <a:endParaRPr lang="ko-KR" altLang="en-US" sz="4400" dirty="0">
+            <a:endParaRPr lang="ko-KR" altLang="en-US" sz="4400" b="1" dirty="0">
               <a:solidFill>
                 <a:schemeClr val="tx1">
                   <a:lumMod val="65000"/>
@@ -6747,9 +7168,9 @@
         <p:grpSpPr>
           <a:xfrm>
             <a:off x="1694919" y="5021916"/>
-            <a:ext cx="4939498" cy="695702"/>
+            <a:ext cx="4898920" cy="584775"/>
             <a:chOff x="1694919" y="2604052"/>
-            <a:chExt cx="4939498" cy="695702"/>
+            <a:chExt cx="4898920" cy="584775"/>
           </a:xfrm>
         </p:grpSpPr>
         <p:sp>
@@ -6828,43 +7249,6 @@
                 <a:t>How to use Package Diagram?</a:t>
               </a:r>
               <a:endParaRPr lang="ko-KR" altLang="en-US" sz="2000" b="1" dirty="0">
-                <a:solidFill>
-                  <a:schemeClr val="accent2">
-                    <a:lumMod val="50000"/>
-                  </a:schemeClr>
-                </a:solidFill>
-              </a:endParaRPr>
-            </a:p>
-          </p:txBody>
-        </p:sp>
-        <p:sp>
-          <p:nvSpPr>
-            <p:cNvPr id="28" name="TextBox 27"/>
-            <p:cNvSpPr txBox="1"/>
-            <p:nvPr/>
-          </p:nvSpPr>
-          <p:spPr>
-            <a:xfrm>
-              <a:off x="2447249" y="2930422"/>
-              <a:ext cx="4187168" cy="369332"/>
-            </a:xfrm>
-            <a:prstGeom prst="rect">
-              <a:avLst/>
-            </a:prstGeom>
-            <a:noFill/>
-          </p:spPr>
-          <p:txBody>
-            <a:bodyPr wrap="square" rtlCol="0">
-              <a:spAutoFit/>
-            </a:bodyPr>
-            <a:lstStyle/>
-            <a:p>
-              <a:pPr algn="just"/>
-              <a:r>
-                <a:rPr lang="en-US" altLang="ko-KR" dirty="0"/>
-                <a:t>Explain</a:t>
-              </a:r>
-              <a:endParaRPr lang="ko-KR" altLang="en-US" sz="1300" dirty="0">
                 <a:solidFill>
                   <a:schemeClr val="accent2">
                     <a:lumMod val="50000"/>
@@ -7018,6 +7402,55 @@
           </p:txBody>
         </p:sp>
       </p:grpSp>
+      <p:sp>
+        <p:nvSpPr>
+          <p:cNvPr id="34" name="TextBox 33">
+            <a:extLst>
+              <a:ext uri="{FF2B5EF4-FFF2-40B4-BE49-F238E27FC236}">
+                <a16:creationId xmlns:a16="http://schemas.microsoft.com/office/drawing/2014/main" id="{721CD76F-1789-409A-BB76-274F34A0B2B5}"/>
+              </a:ext>
+            </a:extLst>
+          </p:cNvPr>
+          <p:cNvSpPr txBox="1"/>
+          <p:nvPr/>
+        </p:nvSpPr>
+        <p:spPr>
+          <a:xfrm>
+            <a:off x="2456160" y="5420425"/>
+            <a:ext cx="4285534" cy="292388"/>
+          </a:xfrm>
+          <a:prstGeom prst="rect">
+            <a:avLst/>
+          </a:prstGeom>
+          <a:noFill/>
+        </p:spPr>
+        <p:txBody>
+          <a:bodyPr wrap="square" rtlCol="0">
+            <a:spAutoFit/>
+          </a:bodyPr>
+          <a:lstStyle/>
+          <a:p>
+            <a:pPr algn="just"/>
+            <a:r>
+              <a:rPr lang="en-US" altLang="ko-KR" sz="1300" dirty="0">
+                <a:solidFill>
+                  <a:schemeClr val="accent2">
+                    <a:lumMod val="50000"/>
+                  </a:schemeClr>
+                </a:solidFill>
+              </a:rPr>
+              <a:t>Explain for Package diagram mechanism</a:t>
+            </a:r>
+            <a:endParaRPr lang="ko-KR" altLang="en-US" sz="1300" dirty="0">
+              <a:solidFill>
+                <a:schemeClr val="accent2">
+                  <a:lumMod val="50000"/>
+                </a:schemeClr>
+              </a:solidFill>
+            </a:endParaRPr>
+          </a:p>
+        </p:txBody>
+      </p:sp>
     </p:spTree>
     <p:extLst>
       <p:ext uri="{BB962C8B-B14F-4D97-AF65-F5344CB8AC3E}">
@@ -7205,7 +7638,7 @@
         <p:spPr>
           <a:xfrm>
             <a:off x="298173" y="337932"/>
-            <a:ext cx="856325" cy="1107996"/>
+            <a:ext cx="1165704" cy="1107996"/>
           </a:xfrm>
           <a:prstGeom prst="rect">
             <a:avLst/>
@@ -7219,7 +7652,7 @@
           <a:lstStyle/>
           <a:p>
             <a:r>
-              <a:rPr lang="en-US" altLang="ko-KR" sz="6600" dirty="0">
+              <a:rPr lang="en-US" altLang="ko-KR" sz="6600" b="1" dirty="0">
                 <a:solidFill>
                   <a:schemeClr val="accent3">
                     <a:lumMod val="20000"/>
@@ -7231,7 +7664,7 @@
               </a:rPr>
               <a:t>01</a:t>
             </a:r>
-            <a:endParaRPr lang="ko-KR" altLang="en-US" sz="6600" dirty="0">
+            <a:endParaRPr lang="ko-KR" altLang="en-US" sz="6600" b="1" dirty="0">
               <a:solidFill>
                 <a:schemeClr val="accent3">
                   <a:lumMod val="20000"/>
@@ -7255,7 +7688,7 @@
         <p:spPr>
           <a:xfrm>
             <a:off x="248478" y="1560444"/>
-            <a:ext cx="906020" cy="0"/>
+            <a:ext cx="1320346" cy="0"/>
           </a:xfrm>
           <a:prstGeom prst="line">
             <a:avLst/>
@@ -7292,10 +7725,10 @@
         </p:nvGrpSpPr>
         <p:grpSpPr>
           <a:xfrm>
-            <a:off x="2691542" y="1865292"/>
-            <a:ext cx="4646254" cy="800220"/>
-            <a:chOff x="2097333" y="2607702"/>
-            <a:chExt cx="3097375" cy="800220"/>
+            <a:off x="3290601" y="2304550"/>
+            <a:ext cx="8687708" cy="1338825"/>
+            <a:chOff x="2359744" y="2607703"/>
+            <a:chExt cx="3805544" cy="413624"/>
           </a:xfrm>
         </p:grpSpPr>
         <p:sp>
@@ -7306,8 +7739,8 @@
           </p:nvSpPr>
           <p:spPr>
             <a:xfrm>
-              <a:off x="2097333" y="2607702"/>
-              <a:ext cx="2824588" cy="646331"/>
+              <a:off x="2359744" y="2607703"/>
+              <a:ext cx="2299766" cy="242470"/>
             </a:xfrm>
             <a:prstGeom prst="rect">
               <a:avLst/>
@@ -7322,20 +7755,16 @@
             <a:p>
               <a:pPr algn="ctr"/>
               <a:r>
-                <a:rPr lang="en-US" altLang="ko-KR" sz="3600" b="1" dirty="0">
+                <a:rPr lang="en-US" altLang="ko-KR" sz="4500" b="1" dirty="0">
                   <a:solidFill>
-                    <a:schemeClr val="accent2">
-                      <a:lumMod val="50000"/>
-                    </a:schemeClr>
+                    <a:schemeClr val="accent1"/>
                   </a:solidFill>
                 </a:rPr>
                 <a:t>Why we use UML?</a:t>
               </a:r>
-              <a:endParaRPr lang="ko-KR" altLang="en-US" sz="3600" b="1" dirty="0">
+              <a:endParaRPr lang="ko-KR" altLang="en-US" sz="4500" b="1" dirty="0">
                 <a:solidFill>
-                  <a:schemeClr val="accent2">
-                    <a:lumMod val="50000"/>
-                  </a:schemeClr>
+                  <a:schemeClr val="accent1"/>
                 </a:solidFill>
               </a:endParaRPr>
             </a:p>
@@ -7349,8 +7778,8 @@
           </p:nvSpPr>
           <p:spPr>
             <a:xfrm>
-              <a:off x="2183152" y="3100145"/>
-              <a:ext cx="3011556" cy="307777"/>
+              <a:off x="3153732" y="2850172"/>
+              <a:ext cx="3011556" cy="171155"/>
             </a:xfrm>
             <a:prstGeom prst="rect">
               <a:avLst/>
@@ -7365,7 +7794,7 @@
             <a:p>
               <a:pPr algn="just"/>
               <a:r>
-                <a:rPr lang="en-US" altLang="ko-KR" sz="1400" dirty="0">
+                <a:rPr lang="en-US" altLang="ko-KR" sz="3000" dirty="0">
                   <a:solidFill>
                     <a:schemeClr val="accent2">
                       <a:lumMod val="50000"/>
@@ -7374,7 +7803,7 @@
                 </a:rPr>
                 <a:t>Why we must learn for UML Diagram</a:t>
               </a:r>
-              <a:endParaRPr lang="ko-KR" altLang="en-US" sz="1400" dirty="0">
+              <a:endParaRPr lang="ko-KR" altLang="en-US" sz="3000" dirty="0">
                 <a:solidFill>
                   <a:schemeClr val="accent2">
                     <a:lumMod val="50000"/>
@@ -9814,14 +10243,6 @@
 <file path=ppt/slides/slide8.xml><?xml version="1.0" encoding="utf-8"?>
 <p:sld xmlns:a="http://schemas.openxmlformats.org/drawingml/2006/main" xmlns:r="http://schemas.openxmlformats.org/officeDocument/2006/relationships" xmlns:p="http://schemas.openxmlformats.org/presentationml/2006/main">
   <p:cSld>
-    <p:bg>
-      <p:bgPr>
-        <a:solidFill>
-          <a:schemeClr val="accent6"/>
-        </a:solidFill>
-        <a:effectLst/>
-      </p:bgPr>
-    </p:bg>
     <p:spTree>
       <p:nvGrpSpPr>
         <p:cNvPr id="1" name=""/>
@@ -9838,7 +10259,7 @@
       </p:grpSpPr>
       <p:pic>
         <p:nvPicPr>
-          <p:cNvPr id="6" name="그림 5"/>
+          <p:cNvPr id="10" name="그림 9"/>
           <p:cNvPicPr>
             <a:picLocks noChangeAspect="1"/>
           </p:cNvPicPr>
@@ -9852,13 +10273,13 @@
               </a:ext>
             </a:extLst>
           </a:blip>
-          <a:srcRect t="7845" b="7845"/>
+          <a:srcRect l="1617" r="7025"/>
           <a:stretch/>
         </p:blipFill>
         <p:spPr>
           <a:xfrm>
-            <a:off x="0" y="0"/>
-            <a:ext cx="12192000" cy="6858000"/>
+            <a:off x="682048" y="-1"/>
+            <a:ext cx="11522864" cy="6865263"/>
           </a:xfrm>
           <a:prstGeom prst="rect">
             <a:avLst/>
@@ -9873,7 +10294,7 @@
         </p:nvSpPr>
         <p:spPr>
           <a:xfrm>
-            <a:off x="0" y="0"/>
+            <a:off x="0" y="7261"/>
             <a:ext cx="12204912" cy="6858001"/>
           </a:xfrm>
           <a:prstGeom prst="rect">
@@ -9881,7 +10302,7 @@
           </a:prstGeom>
           <a:solidFill>
             <a:schemeClr val="accent6">
-              <a:alpha val="80000"/>
+              <a:alpha val="60000"/>
             </a:schemeClr>
           </a:solidFill>
           <a:ln>
@@ -9973,7 +10394,7 @@
         <p:spPr>
           <a:xfrm>
             <a:off x="298173" y="337932"/>
-            <a:ext cx="955711" cy="1107996"/>
+            <a:ext cx="1165704" cy="1107996"/>
           </a:xfrm>
           <a:prstGeom prst="rect">
             <a:avLst/>
@@ -9987,7 +10408,7 @@
           <a:lstStyle/>
           <a:p>
             <a:r>
-              <a:rPr lang="en-US" altLang="ko-KR" sz="6600" dirty="0">
+              <a:rPr lang="en-US" altLang="ko-KR" sz="6600" b="1" dirty="0">
                 <a:solidFill>
                   <a:schemeClr val="accent3">
                     <a:lumMod val="20000"/>
@@ -9999,7 +10420,7 @@
               </a:rPr>
               <a:t>02</a:t>
             </a:r>
-            <a:endParaRPr lang="ko-KR" altLang="en-US" sz="6600" dirty="0">
+            <a:endParaRPr lang="ko-KR" altLang="en-US" sz="6600" b="1" dirty="0">
               <a:solidFill>
                 <a:schemeClr val="accent3">
                   <a:lumMod val="20000"/>
@@ -10023,7 +10444,7 @@
         <p:spPr>
           <a:xfrm>
             <a:off x="248478" y="1560444"/>
-            <a:ext cx="906020" cy="0"/>
+            <a:ext cx="1320346" cy="0"/>
           </a:xfrm>
           <a:prstGeom prst="line">
             <a:avLst/>
@@ -10060,10 +10481,10 @@
         </p:nvGrpSpPr>
         <p:grpSpPr>
           <a:xfrm>
-            <a:off x="2820277" y="3429000"/>
-            <a:ext cx="4517521" cy="803870"/>
-            <a:chOff x="2183152" y="2604052"/>
-            <a:chExt cx="3011556" cy="803870"/>
+            <a:off x="2928292" y="2304546"/>
+            <a:ext cx="9140098" cy="1862050"/>
+            <a:chOff x="2102037" y="2607702"/>
+            <a:chExt cx="4003708" cy="575272"/>
           </a:xfrm>
         </p:grpSpPr>
         <p:sp>
@@ -10074,8 +10495,8 @@
           </p:nvSpPr>
           <p:spPr>
             <a:xfrm>
-              <a:off x="2183152" y="2604052"/>
-              <a:ext cx="2359737" cy="646331"/>
+              <a:off x="2102037" y="2607702"/>
+              <a:ext cx="3451334" cy="242470"/>
             </a:xfrm>
             <a:prstGeom prst="rect">
               <a:avLst/>
@@ -10088,23 +10509,15 @@
             </a:bodyPr>
             <a:lstStyle/>
             <a:p>
+              <a:pPr algn="ctr"/>
               <a:r>
-                <a:rPr lang="en-US" altLang="ko-KR" sz="3600" b="1" dirty="0">
+                <a:rPr lang="en-US" altLang="ko-KR" sz="4500" b="1" dirty="0">
                   <a:solidFill>
-                    <a:schemeClr val="accent2">
-                      <a:lumMod val="50000"/>
-                    </a:schemeClr>
+                    <a:schemeClr val="accent1"/>
                   </a:solidFill>
                 </a:rPr>
-                <a:t>Insert Text Here</a:t>
+                <a:t>What is Packages Diagram?</a:t>
               </a:r>
-              <a:endParaRPr lang="ko-KR" altLang="en-US" sz="3600" b="1" dirty="0">
-                <a:solidFill>
-                  <a:schemeClr val="accent2">
-                    <a:lumMod val="50000"/>
-                  </a:schemeClr>
-                </a:solidFill>
-              </a:endParaRPr>
             </a:p>
           </p:txBody>
         </p:sp>
@@ -10116,8 +10529,8 @@
           </p:nvSpPr>
           <p:spPr>
             <a:xfrm>
-              <a:off x="2183152" y="3100145"/>
-              <a:ext cx="3011556" cy="307777"/>
+              <a:off x="2775751" y="2850172"/>
+              <a:ext cx="3329994" cy="332802"/>
             </a:xfrm>
             <a:prstGeom prst="rect">
               <a:avLst/>
@@ -10130,17 +10543,31 @@
             </a:bodyPr>
             <a:lstStyle/>
             <a:p>
+              <a:pPr algn="just"/>
               <a:r>
-                <a:rPr lang="en-US" altLang="ko-KR" sz="1400" dirty="0">
+                <a:rPr lang="en-US" altLang="ko-KR" sz="3200" dirty="0">
                   <a:solidFill>
                     <a:schemeClr val="accent2">
                       <a:lumMod val="50000"/>
                     </a:schemeClr>
                   </a:solidFill>
                 </a:rPr>
-                <a:t>Lorem Ipsum is simply dummy text of the printing</a:t>
+                <a:t>Definition of </a:t>
               </a:r>
-              <a:endParaRPr lang="ko-KR" altLang="en-US" sz="1400" dirty="0">
+            </a:p>
+            <a:p>
+              <a:pPr algn="r"/>
+              <a:r>
+                <a:rPr lang="en-US" altLang="ko-KR" sz="3200" dirty="0">
+                  <a:solidFill>
+                    <a:schemeClr val="accent2">
+                      <a:lumMod val="50000"/>
+                    </a:schemeClr>
+                  </a:solidFill>
+                </a:rPr>
+                <a:t>packages diagram and Component</a:t>
+              </a:r>
+              <a:endParaRPr lang="ko-KR" altLang="en-US" sz="3200" dirty="0">
                 <a:solidFill>
                   <a:schemeClr val="accent2">
                     <a:lumMod val="50000"/>
@@ -10154,7 +10581,7 @@
     </p:spTree>
     <p:extLst>
       <p:ext uri="{BB962C8B-B14F-4D97-AF65-F5344CB8AC3E}">
-        <p14:creationId xmlns:p14="http://schemas.microsoft.com/office/powerpoint/2010/main" val="2029630330"/>
+        <p14:creationId xmlns:p14="http://schemas.microsoft.com/office/powerpoint/2010/main" val="1487049187"/>
       </p:ext>
     </p:extLst>
   </p:cSld>
@@ -11079,4 +11506,299 @@
     </a:ext>
   </a:extLst>
 </a:theme>
+</file>
+
+<file path=ppt/theme/theme2.xml><?xml version="1.0" encoding="utf-8"?>
+<a:theme xmlns:a="http://schemas.openxmlformats.org/drawingml/2006/main" name="Office 테마">
+  <a:themeElements>
+    <a:clrScheme name="Office">
+      <a:dk1>
+        <a:sysClr val="windowText" lastClr="000000"/>
+      </a:dk1>
+      <a:lt1>
+        <a:sysClr val="window" lastClr="FFFFFF"/>
+      </a:lt1>
+      <a:dk2>
+        <a:srgbClr val="44546A"/>
+      </a:dk2>
+      <a:lt2>
+        <a:srgbClr val="E7E6E6"/>
+      </a:lt2>
+      <a:accent1>
+        <a:srgbClr val="4472C4"/>
+      </a:accent1>
+      <a:accent2>
+        <a:srgbClr val="ED7D31"/>
+      </a:accent2>
+      <a:accent3>
+        <a:srgbClr val="A5A5A5"/>
+      </a:accent3>
+      <a:accent4>
+        <a:srgbClr val="FFC000"/>
+      </a:accent4>
+      <a:accent5>
+        <a:srgbClr val="5B9BD5"/>
+      </a:accent5>
+      <a:accent6>
+        <a:srgbClr val="70AD47"/>
+      </a:accent6>
+      <a:hlink>
+        <a:srgbClr val="0563C1"/>
+      </a:hlink>
+      <a:folHlink>
+        <a:srgbClr val="954F72"/>
+      </a:folHlink>
+    </a:clrScheme>
+    <a:fontScheme name="Office">
+      <a:majorFont>
+        <a:latin typeface="맑은 고딕" panose="020F0302020204030204"/>
+        <a:ea typeface=""/>
+        <a:cs typeface=""/>
+        <a:font script="Jpan" typeface="游ゴシック Light"/>
+        <a:font script="Hang" typeface="맑은 고딕"/>
+        <a:font script="Hans" typeface="等线 Light"/>
+        <a:font script="Hant" typeface="新細明體"/>
+        <a:font script="Arab" typeface="Times New Roman"/>
+        <a:font script="Hebr" typeface="Times New Roman"/>
+        <a:font script="Thai" typeface="Angsana New"/>
+        <a:font script="Ethi" typeface="Nyala"/>
+        <a:font script="Beng" typeface="Vrinda"/>
+        <a:font script="Gujr" typeface="Shruti"/>
+        <a:font script="Khmr" typeface="MoolBoran"/>
+        <a:font script="Knda" typeface="Tunga"/>
+        <a:font script="Guru" typeface="Raavi"/>
+        <a:font script="Cans" typeface="Euphemia"/>
+        <a:font script="Cher" typeface="Plantagenet Cherokee"/>
+        <a:font script="Yiii" typeface="Microsoft Yi Baiti"/>
+        <a:font script="Tibt" typeface="Microsoft Himalaya"/>
+        <a:font script="Thaa" typeface="MV Boli"/>
+        <a:font script="Deva" typeface="Mangal"/>
+        <a:font script="Telu" typeface="Gautami"/>
+        <a:font script="Taml" typeface="Latha"/>
+        <a:font script="Syrc" typeface="Estrangelo Edessa"/>
+        <a:font script="Orya" typeface="Kalinga"/>
+        <a:font script="Mlym" typeface="Kartika"/>
+        <a:font script="Laoo" typeface="DokChampa"/>
+        <a:font script="Sinh" typeface="Iskoola Pota"/>
+        <a:font script="Mong" typeface="Mongolian Baiti"/>
+        <a:font script="Viet" typeface="Times New Roman"/>
+        <a:font script="Uigh" typeface="Microsoft Uighur"/>
+        <a:font script="Geor" typeface="Sylfaen"/>
+        <a:font script="Armn" typeface="Arial"/>
+        <a:font script="Bugi" typeface="Leelawadee UI"/>
+        <a:font script="Bopo" typeface="Microsoft JhengHei"/>
+        <a:font script="Java" typeface="Javanese Text"/>
+        <a:font script="Lisu" typeface="Segoe UI"/>
+        <a:font script="Mymr" typeface="Myanmar Text"/>
+        <a:font script="Nkoo" typeface="Ebrima"/>
+        <a:font script="Olck" typeface="Nirmala UI"/>
+        <a:font script="Osma" typeface="Ebrima"/>
+        <a:font script="Phag" typeface="Phagspa"/>
+        <a:font script="Syrn" typeface="Estrangelo Edessa"/>
+        <a:font script="Syrj" typeface="Estrangelo Edessa"/>
+        <a:font script="Syre" typeface="Estrangelo Edessa"/>
+        <a:font script="Sora" typeface="Nirmala UI"/>
+        <a:font script="Tale" typeface="Microsoft Tai Le"/>
+        <a:font script="Talu" typeface="Microsoft New Tai Lue"/>
+        <a:font script="Tfng" typeface="Ebrima"/>
+      </a:majorFont>
+      <a:minorFont>
+        <a:latin typeface="맑은 고딕" panose="020F0502020204030204"/>
+        <a:ea typeface=""/>
+        <a:cs typeface=""/>
+        <a:font script="Jpan" typeface="游ゴシック"/>
+        <a:font script="Hang" typeface="맑은 고딕"/>
+        <a:font script="Hans" typeface="等线"/>
+        <a:font script="Hant" typeface="新細明體"/>
+        <a:font script="Arab" typeface="Arial"/>
+        <a:font script="Hebr" typeface="Arial"/>
+        <a:font script="Thai" typeface="Cordia New"/>
+        <a:font script="Ethi" typeface="Nyala"/>
+        <a:font script="Beng" typeface="Vrinda"/>
+        <a:font script="Gujr" typeface="Shruti"/>
+        <a:font script="Khmr" typeface="DaunPenh"/>
+        <a:font script="Knda" typeface="Tunga"/>
+        <a:font script="Guru" typeface="Raavi"/>
+        <a:font script="Cans" typeface="Euphemia"/>
+        <a:font script="Cher" typeface="Plantagenet Cherokee"/>
+        <a:font script="Yiii" typeface="Microsoft Yi Baiti"/>
+        <a:font script="Tibt" typeface="Microsoft Himalaya"/>
+        <a:font script="Thaa" typeface="MV Boli"/>
+        <a:font script="Deva" typeface="Mangal"/>
+        <a:font script="Telu" typeface="Gautami"/>
+        <a:font script="Taml" typeface="Latha"/>
+        <a:font script="Syrc" typeface="Estrangelo Edessa"/>
+        <a:font script="Orya" typeface="Kalinga"/>
+        <a:font script="Mlym" typeface="Kartika"/>
+        <a:font script="Laoo" typeface="DokChampa"/>
+        <a:font script="Sinh" typeface="Iskoola Pota"/>
+        <a:font script="Mong" typeface="Mongolian Baiti"/>
+        <a:font script="Viet" typeface="Arial"/>
+        <a:font script="Uigh" typeface="Microsoft Uighur"/>
+        <a:font script="Geor" typeface="Sylfaen"/>
+        <a:font script="Armn" typeface="Arial"/>
+        <a:font script="Bugi" typeface="Leelawadee UI"/>
+        <a:font script="Bopo" typeface="Microsoft JhengHei"/>
+        <a:font script="Java" typeface="Javanese Text"/>
+        <a:font script="Lisu" typeface="Segoe UI"/>
+        <a:font script="Mymr" typeface="Myanmar Text"/>
+        <a:font script="Nkoo" typeface="Ebrima"/>
+        <a:font script="Olck" typeface="Nirmala UI"/>
+        <a:font script="Osma" typeface="Ebrima"/>
+        <a:font script="Phag" typeface="Phagspa"/>
+        <a:font script="Syrn" typeface="Estrangelo Edessa"/>
+        <a:font script="Syrj" typeface="Estrangelo Edessa"/>
+        <a:font script="Syre" typeface="Estrangelo Edessa"/>
+        <a:font script="Sora" typeface="Nirmala UI"/>
+        <a:font script="Tale" typeface="Microsoft Tai Le"/>
+        <a:font script="Talu" typeface="Microsoft New Tai Lue"/>
+        <a:font script="Tfng" typeface="Ebrima"/>
+      </a:minorFont>
+    </a:fontScheme>
+    <a:fmtScheme name="Office">
+      <a:fillStyleLst>
+        <a:solidFill>
+          <a:schemeClr val="phClr"/>
+        </a:solidFill>
+        <a:gradFill rotWithShape="1">
+          <a:gsLst>
+            <a:gs pos="0">
+              <a:schemeClr val="phClr">
+                <a:lumMod val="110000"/>
+                <a:satMod val="105000"/>
+                <a:tint val="67000"/>
+              </a:schemeClr>
+            </a:gs>
+            <a:gs pos="50000">
+              <a:schemeClr val="phClr">
+                <a:lumMod val="105000"/>
+                <a:satMod val="103000"/>
+                <a:tint val="73000"/>
+              </a:schemeClr>
+            </a:gs>
+            <a:gs pos="100000">
+              <a:schemeClr val="phClr">
+                <a:lumMod val="105000"/>
+                <a:satMod val="109000"/>
+                <a:tint val="81000"/>
+              </a:schemeClr>
+            </a:gs>
+          </a:gsLst>
+          <a:lin ang="5400000" scaled="0"/>
+        </a:gradFill>
+        <a:gradFill rotWithShape="1">
+          <a:gsLst>
+            <a:gs pos="0">
+              <a:schemeClr val="phClr">
+                <a:satMod val="103000"/>
+                <a:lumMod val="102000"/>
+                <a:tint val="94000"/>
+              </a:schemeClr>
+            </a:gs>
+            <a:gs pos="50000">
+              <a:schemeClr val="phClr">
+                <a:satMod val="110000"/>
+                <a:lumMod val="100000"/>
+                <a:shade val="100000"/>
+              </a:schemeClr>
+            </a:gs>
+            <a:gs pos="100000">
+              <a:schemeClr val="phClr">
+                <a:lumMod val="99000"/>
+                <a:satMod val="120000"/>
+                <a:shade val="78000"/>
+              </a:schemeClr>
+            </a:gs>
+          </a:gsLst>
+          <a:lin ang="5400000" scaled="0"/>
+        </a:gradFill>
+      </a:fillStyleLst>
+      <a:lnStyleLst>
+        <a:ln w="6350" cap="flat" cmpd="sng" algn="ctr">
+          <a:solidFill>
+            <a:schemeClr val="phClr"/>
+          </a:solidFill>
+          <a:prstDash val="solid"/>
+          <a:miter lim="800000"/>
+        </a:ln>
+        <a:ln w="12700" cap="flat" cmpd="sng" algn="ctr">
+          <a:solidFill>
+            <a:schemeClr val="phClr"/>
+          </a:solidFill>
+          <a:prstDash val="solid"/>
+          <a:miter lim="800000"/>
+        </a:ln>
+        <a:ln w="19050" cap="flat" cmpd="sng" algn="ctr">
+          <a:solidFill>
+            <a:schemeClr val="phClr"/>
+          </a:solidFill>
+          <a:prstDash val="solid"/>
+          <a:miter lim="800000"/>
+        </a:ln>
+      </a:lnStyleLst>
+      <a:effectStyleLst>
+        <a:effectStyle>
+          <a:effectLst/>
+        </a:effectStyle>
+        <a:effectStyle>
+          <a:effectLst/>
+        </a:effectStyle>
+        <a:effectStyle>
+          <a:effectLst>
+            <a:outerShdw blurRad="57150" dist="19050" dir="5400000" algn="ctr" rotWithShape="0">
+              <a:srgbClr val="000000">
+                <a:alpha val="63000"/>
+              </a:srgbClr>
+            </a:outerShdw>
+          </a:effectLst>
+        </a:effectStyle>
+      </a:effectStyleLst>
+      <a:bgFillStyleLst>
+        <a:solidFill>
+          <a:schemeClr val="phClr"/>
+        </a:solidFill>
+        <a:solidFill>
+          <a:schemeClr val="phClr">
+            <a:tint val="95000"/>
+            <a:satMod val="170000"/>
+          </a:schemeClr>
+        </a:solidFill>
+        <a:gradFill rotWithShape="1">
+          <a:gsLst>
+            <a:gs pos="0">
+              <a:schemeClr val="phClr">
+                <a:tint val="93000"/>
+                <a:satMod val="150000"/>
+                <a:shade val="98000"/>
+                <a:lumMod val="102000"/>
+              </a:schemeClr>
+            </a:gs>
+            <a:gs pos="50000">
+              <a:schemeClr val="phClr">
+                <a:tint val="98000"/>
+                <a:satMod val="130000"/>
+                <a:shade val="90000"/>
+                <a:lumMod val="103000"/>
+              </a:schemeClr>
+            </a:gs>
+            <a:gs pos="100000">
+              <a:schemeClr val="phClr">
+                <a:shade val="63000"/>
+                <a:satMod val="120000"/>
+              </a:schemeClr>
+            </a:gs>
+          </a:gsLst>
+          <a:lin ang="5400000" scaled="0"/>
+        </a:gradFill>
+      </a:bgFillStyleLst>
+    </a:fmtScheme>
+  </a:themeElements>
+  <a:objectDefaults/>
+  <a:extraClrSchemeLst/>
+  <a:extLst>
+    <a:ext uri="{05A4C25C-085E-4340-85A3-A5531E510DB2}">
+      <thm15:themeFamily xmlns:thm15="http://schemas.microsoft.com/office/thememl/2012/main" name="Office Theme" id="{62F939B6-93AF-4DB8-9C6B-D6C7DFDC589F}" vid="{4A3C46E8-61CC-4603-A589-7422A47A8E4A}"/>
+    </a:ext>
+  </a:extLst>
+</a:theme>
 </file>
</xml_diff>